<commit_message>
Check reconstructions of final models and DINEOF for selected slp and sst RW samples
</commit_message>
<xml_diff>
--- a/presentations/20230202_unet_4conv_slp_CESM_results_and_storyline.pptx
+++ b/presentations/20230202_unet_4conv_slp_CESM_results_and_storyline.pptx
@@ -5,7 +5,7 @@
     <p:sldMasterId id="2147483648" r:id="rId1"/>
   </p:sldMasterIdLst>
   <p:notesMasterIdLst>
-    <p:notesMasterId r:id="rId21"/>
+    <p:notesMasterId r:id="rId22"/>
   </p:notesMasterIdLst>
   <p:sldIdLst>
     <p:sldId id="256" r:id="rId2"/>
@@ -27,6 +27,7 @@
     <p:sldId id="279" r:id="rId18"/>
     <p:sldId id="280" r:id="rId19"/>
     <p:sldId id="281" r:id="rId20"/>
+    <p:sldId id="284" r:id="rId21"/>
   </p:sldIdLst>
   <p:sldSz cx="12192000" cy="6858000"/>
   <p:notesSz cx="6858000" cy="9144000"/>
@@ -214,7 +215,7 @@
           </a:lstStyle>
           <a:p>
             <a:fld id="{B35BE548-DE05-8149-9395-93E03CC73C13}" type="datetimeFigureOut">
-              <a:t>02.02.23</a:t>
+              <a:t>03.02.23</a:t>
             </a:fld>
             <a:endParaRPr lang="de-DE"/>
           </a:p>
@@ -794,7 +795,7 @@
           <a:lstStyle/>
           <a:p>
             <a:fld id="{F7A3446A-3617-0E4A-A439-6DD0C73FFDE1}" type="datetimeFigureOut">
-              <a:t>02.02.23</a:t>
+              <a:t>03.02.23</a:t>
             </a:fld>
             <a:endParaRPr lang="de-DE"/>
           </a:p>
@@ -990,7 +991,7 @@
           <a:lstStyle/>
           <a:p>
             <a:fld id="{F7A3446A-3617-0E4A-A439-6DD0C73FFDE1}" type="datetimeFigureOut">
-              <a:t>02.02.23</a:t>
+              <a:t>03.02.23</a:t>
             </a:fld>
             <a:endParaRPr lang="de-DE"/>
           </a:p>
@@ -1196,7 +1197,7 @@
           <a:lstStyle/>
           <a:p>
             <a:fld id="{F7A3446A-3617-0E4A-A439-6DD0C73FFDE1}" type="datetimeFigureOut">
-              <a:t>02.02.23</a:t>
+              <a:t>03.02.23</a:t>
             </a:fld>
             <a:endParaRPr lang="de-DE"/>
           </a:p>
@@ -1392,7 +1393,7 @@
           <a:lstStyle/>
           <a:p>
             <a:fld id="{F7A3446A-3617-0E4A-A439-6DD0C73FFDE1}" type="datetimeFigureOut">
-              <a:t>02.02.23</a:t>
+              <a:t>03.02.23</a:t>
             </a:fld>
             <a:endParaRPr lang="de-DE"/>
           </a:p>
@@ -1665,7 +1666,7 @@
           <a:lstStyle/>
           <a:p>
             <a:fld id="{F7A3446A-3617-0E4A-A439-6DD0C73FFDE1}" type="datetimeFigureOut">
-              <a:t>02.02.23</a:t>
+              <a:t>03.02.23</a:t>
             </a:fld>
             <a:endParaRPr lang="de-DE"/>
           </a:p>
@@ -1928,7 +1929,7 @@
           <a:lstStyle/>
           <a:p>
             <a:fld id="{F7A3446A-3617-0E4A-A439-6DD0C73FFDE1}" type="datetimeFigureOut">
-              <a:t>02.02.23</a:t>
+              <a:t>03.02.23</a:t>
             </a:fld>
             <a:endParaRPr lang="de-DE"/>
           </a:p>
@@ -2338,7 +2339,7 @@
           <a:lstStyle/>
           <a:p>
             <a:fld id="{F7A3446A-3617-0E4A-A439-6DD0C73FFDE1}" type="datetimeFigureOut">
-              <a:t>02.02.23</a:t>
+              <a:t>03.02.23</a:t>
             </a:fld>
             <a:endParaRPr lang="de-DE"/>
           </a:p>
@@ -2477,7 +2478,7 @@
           <a:lstStyle/>
           <a:p>
             <a:fld id="{F7A3446A-3617-0E4A-A439-6DD0C73FFDE1}" type="datetimeFigureOut">
-              <a:t>02.02.23</a:t>
+              <a:t>03.02.23</a:t>
             </a:fld>
             <a:endParaRPr lang="de-DE"/>
           </a:p>
@@ -2588,7 +2589,7 @@
           <a:lstStyle/>
           <a:p>
             <a:fld id="{F7A3446A-3617-0E4A-A439-6DD0C73FFDE1}" type="datetimeFigureOut">
-              <a:t>02.02.23</a:t>
+              <a:t>03.02.23</a:t>
             </a:fld>
             <a:endParaRPr lang="de-DE"/>
           </a:p>
@@ -2897,7 +2898,7 @@
           <a:lstStyle/>
           <a:p>
             <a:fld id="{F7A3446A-3617-0E4A-A439-6DD0C73FFDE1}" type="datetimeFigureOut">
-              <a:t>02.02.23</a:t>
+              <a:t>03.02.23</a:t>
             </a:fld>
             <a:endParaRPr lang="de-DE"/>
           </a:p>
@@ -3183,7 +3184,7 @@
           <a:lstStyle/>
           <a:p>
             <a:fld id="{F7A3446A-3617-0E4A-A439-6DD0C73FFDE1}" type="datetimeFigureOut">
-              <a:t>02.02.23</a:t>
+              <a:t>03.02.23</a:t>
             </a:fld>
             <a:endParaRPr lang="de-DE"/>
           </a:p>
@@ -3422,7 +3423,7 @@
           </a:lstStyle>
           <a:p>
             <a:fld id="{F7A3446A-3617-0E4A-A439-6DD0C73FFDE1}" type="datetimeFigureOut">
-              <a:t>02.02.23</a:t>
+              <a:t>03.02.23</a:t>
             </a:fld>
             <a:endParaRPr lang="de-DE"/>
           </a:p>
@@ -5165,12 +5166,273 @@
           <a:chExt cx="0" cy="0"/>
         </a:xfrm>
       </p:grpSpPr>
-      <p:sp>
-        <p:nvSpPr>
-          <p:cNvPr id="6" name="Textfeld 5">
-            <a:extLst>
-              <a:ext uri="{FF2B5EF4-FFF2-40B4-BE49-F238E27FC236}">
-                <a16:creationId xmlns:a16="http://schemas.microsoft.com/office/drawing/2014/main" id="{43BDBBCA-2D64-E13D-E511-E8953ECB5E22}"/>
+      <mc:AlternateContent xmlns:mc="http://schemas.openxmlformats.org/markup-compatibility/2006">
+        <mc:Choice xmlns:a14="http://schemas.microsoft.com/office/drawing/2010/main" Requires="a14">
+          <p:sp>
+            <p:nvSpPr>
+              <p:cNvPr id="6" name="Textfeld 5">
+                <a:extLst>
+                  <a:ext uri="{FF2B5EF4-FFF2-40B4-BE49-F238E27FC236}">
+                    <a16:creationId xmlns:a16="http://schemas.microsoft.com/office/drawing/2014/main" id="{43BDBBCA-2D64-E13D-E511-E8953ECB5E22}"/>
+                  </a:ext>
+                </a:extLst>
+              </p:cNvPr>
+              <p:cNvSpPr txBox="1"/>
+              <p:nvPr/>
+            </p:nvSpPr>
+            <p:spPr>
+              <a:xfrm>
+                <a:off x="181343" y="772262"/>
+                <a:ext cx="11829313" cy="1745863"/>
+              </a:xfrm>
+              <a:prstGeom prst="rect">
+                <a:avLst/>
+              </a:prstGeom>
+              <a:noFill/>
+            </p:spPr>
+            <p:txBody>
+              <a:bodyPr wrap="square" rtlCol="0">
+                <a:spAutoFit/>
+              </a:bodyPr>
+              <a:lstStyle/>
+              <a:p>
+                <a:pPr marL="285750" indent="-285750">
+                  <a:buFont typeface="Arial" panose="020B0604020202020204" pitchFamily="34" charset="0"/>
+                  <a:buChar char="•"/>
+                </a:pPr>
+                <a:r>
+                  <a:rPr lang="de-DE" b="1">
+                    <a:sym typeface="Wingdings" pitchFamily="2" charset="2"/>
+                  </a:rPr>
+                  <a:t>Train models with these fixed optimal masks </a:t>
+                </a:r>
+                <a:r>
+                  <a:rPr lang="de-DE">
+                    <a:sym typeface="Wingdings" pitchFamily="2" charset="2"/>
+                  </a:rPr>
+                  <a:t>of only 14 and 138 grid points, relating to 99.9% and 99% missing values.</a:t>
+                </a:r>
+              </a:p>
+              <a:p>
+                <a:pPr marL="285750" indent="-285750">
+                  <a:buFont typeface="Arial" panose="020B0604020202020204" pitchFamily="34" charset="0"/>
+                  <a:buChar char="•"/>
+                </a:pPr>
+                <a:r>
+                  <a:rPr lang="de-DE">
+                    <a:sym typeface="Wingdings" pitchFamily="2" charset="2"/>
+                  </a:rPr>
+                  <a:t>Find </a:t>
+                </a:r>
+                <a:r>
+                  <a:rPr lang="de-DE" b="1">
+                    <a:sym typeface="Wingdings" pitchFamily="2" charset="2"/>
+                  </a:rPr>
+                  <a:t>considerably lower loss </a:t>
+                </a:r>
+                <a:r>
+                  <a:rPr lang="de-DE">
+                    <a:sym typeface="Wingdings" pitchFamily="2" charset="2"/>
+                  </a:rPr>
+                  <a:t>on training and validation samples, compared to all other models on ultra sparse inputs.</a:t>
+                </a:r>
+              </a:p>
+              <a:p>
+                <a:pPr marL="285750" indent="-285750">
+                  <a:buFont typeface="Arial" panose="020B0604020202020204" pitchFamily="34" charset="0"/>
+                  <a:buChar char="•"/>
+                </a:pPr>
+                <a:r>
+                  <a:rPr lang="de-DE">
+                    <a:sym typeface="Wingdings" pitchFamily="2" charset="2"/>
+                  </a:rPr>
+                  <a:t>Proofs, that we can reconstruct full information from ultra sparse inputs, if we </a:t>
+                </a:r>
+                <a:r>
+                  <a:rPr lang="de-DE" b="1">
+                    <a:sym typeface="Wingdings" pitchFamily="2" charset="2"/>
+                  </a:rPr>
+                  <a:t>include the „right“ grid points</a:t>
+                </a:r>
+                <a:r>
+                  <a:rPr lang="de-DE">
+                    <a:sym typeface="Wingdings" pitchFamily="2" charset="2"/>
+                  </a:rPr>
+                  <a:t>!</a:t>
+                </a:r>
+              </a:p>
+              <a:p>
+                <a:pPr marL="285750" indent="-285750">
+                  <a:buFont typeface="Arial" panose="020B0604020202020204" pitchFamily="34" charset="0"/>
+                  <a:buChar char="•"/>
+                </a:pPr>
+                <a:r>
+                  <a:rPr lang="de-DE">
+                    <a:sym typeface="Wingdings" pitchFamily="2" charset="2"/>
+                  </a:rPr>
+                  <a:t>Note: We could have – by coincidence – found the optimal mask with randomly picking 14 grid points in our ‚fixed‘ mask model. But chances are </a:t>
+                </a:r>
+                <a14:m>
+                  <m:oMath xmlns:m="http://schemas.openxmlformats.org/officeDocument/2006/math">
+                    <m:f>
+                      <m:fPr>
+                        <m:ctrlPr>
+                          <a:rPr lang="de-DE" b="0" i="1">
+                            <a:latin typeface="Cambria Math" panose="02040503050406030204" pitchFamily="18" charset="0"/>
+                            <a:sym typeface="Wingdings" pitchFamily="2" charset="2"/>
+                          </a:rPr>
+                        </m:ctrlPr>
+                      </m:fPr>
+                      <m:num>
+                        <m:r>
+                          <a:rPr lang="de-DE" b="0" i="1">
+                            <a:latin typeface="Cambria Math" panose="02040503050406030204" pitchFamily="18" charset="0"/>
+                            <a:sym typeface="Wingdings" pitchFamily="2" charset="2"/>
+                          </a:rPr>
+                          <m:t>1</m:t>
+                        </m:r>
+                      </m:num>
+                      <m:den>
+                        <m:d>
+                          <m:dPr>
+                            <m:ctrlPr>
+                              <a:rPr lang="de-DE" i="1">
+                                <a:latin typeface="Cambria Math" panose="02040503050406030204" pitchFamily="18" charset="0"/>
+                                <a:sym typeface="Wingdings" pitchFamily="2" charset="2"/>
+                              </a:rPr>
+                            </m:ctrlPr>
+                          </m:dPr>
+                          <m:e>
+                            <m:eqArr>
+                              <m:eqArrPr>
+                                <m:ctrlPr>
+                                  <a:rPr lang="de-DE" b="0" i="1">
+                                    <a:latin typeface="Cambria Math" panose="02040503050406030204" pitchFamily="18" charset="0"/>
+                                    <a:sym typeface="Wingdings" pitchFamily="2" charset="2"/>
+                                  </a:rPr>
+                                </m:ctrlPr>
+                              </m:eqArrPr>
+                              <m:e>
+                                <m:r>
+                                  <a:rPr lang="de-DE" b="0" i="1">
+                                    <a:latin typeface="Cambria Math" panose="02040503050406030204" pitchFamily="18" charset="0"/>
+                                    <a:sym typeface="Wingdings" pitchFamily="2" charset="2"/>
+                                  </a:rPr>
+                                  <m:t>13,824</m:t>
+                                </m:r>
+                              </m:e>
+                              <m:e>
+                                <m:r>
+                                  <a:rPr lang="de-DE" b="0" i="1">
+                                    <a:latin typeface="Cambria Math" panose="02040503050406030204" pitchFamily="18" charset="0"/>
+                                    <a:sym typeface="Wingdings" pitchFamily="2" charset="2"/>
+                                  </a:rPr>
+                                  <m:t>14</m:t>
+                                </m:r>
+                              </m:e>
+                            </m:eqArr>
+                          </m:e>
+                        </m:d>
+                      </m:den>
+                    </m:f>
+                    <m:r>
+                      <a:rPr lang="de-DE" b="0" i="1">
+                        <a:latin typeface="Cambria Math" panose="02040503050406030204" pitchFamily="18" charset="0"/>
+                        <a:sym typeface="Wingdings" pitchFamily="2" charset="2"/>
+                      </a:rPr>
+                      <m:t>=</m:t>
+                    </m:r>
+                    <m:sSup>
+                      <m:sSupPr>
+                        <m:ctrlPr>
+                          <a:rPr lang="de-DE" b="0" i="1">
+                            <a:latin typeface="Cambria Math" panose="02040503050406030204" pitchFamily="18" charset="0"/>
+                            <a:sym typeface="Wingdings" pitchFamily="2" charset="2"/>
+                          </a:rPr>
+                        </m:ctrlPr>
+                      </m:sSupPr>
+                      <m:e>
+                        <m:r>
+                          <a:rPr lang="de-DE" b="0" i="1">
+                            <a:latin typeface="Cambria Math" panose="02040503050406030204" pitchFamily="18" charset="0"/>
+                            <a:sym typeface="Wingdings" pitchFamily="2" charset="2"/>
+                          </a:rPr>
+                          <m:t>10</m:t>
+                        </m:r>
+                      </m:e>
+                      <m:sup>
+                        <m:r>
+                          <a:rPr lang="de-DE" b="0" i="1">
+                            <a:latin typeface="Cambria Math" panose="02040503050406030204" pitchFamily="18" charset="0"/>
+                            <a:sym typeface="Wingdings" pitchFamily="2" charset="2"/>
+                          </a:rPr>
+                          <m:t>−47</m:t>
+                        </m:r>
+                      </m:sup>
+                    </m:sSup>
+                  </m:oMath>
+                </a14:m>
+                <a:r>
+                  <a:rPr lang="de-DE">
+                    <a:sym typeface="Wingdings" pitchFamily="2" charset="2"/>
+                  </a:rPr>
+                  <a:t>.</a:t>
+                </a:r>
+              </a:p>
+            </p:txBody>
+          </p:sp>
+        </mc:Choice>
+        <mc:Fallback>
+          <p:sp>
+            <p:nvSpPr>
+              <p:cNvPr id="6" name="Textfeld 5">
+                <a:extLst>
+                  <a:ext uri="{FF2B5EF4-FFF2-40B4-BE49-F238E27FC236}">
+                    <a16:creationId xmlns:a16="http://schemas.microsoft.com/office/drawing/2014/main" id="{43BDBBCA-2D64-E13D-E511-E8953ECB5E22}"/>
+                  </a:ext>
+                </a:extLst>
+              </p:cNvPr>
+              <p:cNvSpPr txBox="1">
+                <a:spLocks noRot="1" noChangeAspect="1" noMove="1" noResize="1" noEditPoints="1" noAdjustHandles="1" noChangeArrowheads="1" noChangeShapeType="1" noTextEdit="1"/>
+              </p:cNvSpPr>
+              <p:nvPr/>
+            </p:nvSpPr>
+            <p:spPr>
+              <a:xfrm>
+                <a:off x="181343" y="772262"/>
+                <a:ext cx="11829313" cy="1745863"/>
+              </a:xfrm>
+              <a:prstGeom prst="rect">
+                <a:avLst/>
+              </a:prstGeom>
+              <a:blipFill>
+                <a:blip r:embed="rId2"/>
+                <a:stretch>
+                  <a:fillRect l="-322" t="-1439"/>
+                </a:stretch>
+              </a:blipFill>
+            </p:spPr>
+            <p:txBody>
+              <a:bodyPr/>
+              <a:lstStyle/>
+              <a:p>
+                <a:r>
+                  <a:rPr lang="de-DE">
+                    <a:noFill/>
+                  </a:rPr>
+                  <a:t> </a:t>
+                </a:r>
+              </a:p>
+            </p:txBody>
+          </p:sp>
+        </mc:Fallback>
+      </mc:AlternateContent>
+      <p:sp>
+        <p:nvSpPr>
+          <p:cNvPr id="3" name="Textfeld 2">
+            <a:extLst>
+              <a:ext uri="{FF2B5EF4-FFF2-40B4-BE49-F238E27FC236}">
+                <a16:creationId xmlns:a16="http://schemas.microsoft.com/office/drawing/2014/main" id="{C318182B-364D-C9F7-D1BC-5FD4D9781852}"/>
               </a:ext>
             </a:extLst>
           </p:cNvPr>
@@ -5179,8 +5441,8 @@
         </p:nvSpPr>
         <p:spPr>
           <a:xfrm>
-            <a:off x="181343" y="772262"/>
-            <a:ext cx="11829313" cy="923330"/>
+            <a:off x="193812" y="148283"/>
+            <a:ext cx="8468274" cy="400110"/>
           </a:xfrm>
           <a:prstGeom prst="rect">
             <a:avLst/>
@@ -5193,101 +5455,6 @@
           </a:bodyPr>
           <a:lstStyle/>
           <a:p>
-            <a:pPr marL="285750" indent="-285750">
-              <a:buFont typeface="Arial" panose="020B0604020202020204" pitchFamily="34" charset="0"/>
-              <a:buChar char="•"/>
-            </a:pPr>
-            <a:r>
-              <a:rPr lang="de-DE" b="1">
-                <a:sym typeface="Wingdings" pitchFamily="2" charset="2"/>
-              </a:rPr>
-              <a:t>Train models with these fixed optimal masks </a:t>
-            </a:r>
-            <a:r>
-              <a:rPr lang="de-DE">
-                <a:sym typeface="Wingdings" pitchFamily="2" charset="2"/>
-              </a:rPr>
-              <a:t>of only 14 and 138 grid points, relating to 99.9% and 99% missing values.</a:t>
-            </a:r>
-          </a:p>
-          <a:p>
-            <a:pPr marL="285750" indent="-285750">
-              <a:buFont typeface="Arial" panose="020B0604020202020204" pitchFamily="34" charset="0"/>
-              <a:buChar char="•"/>
-            </a:pPr>
-            <a:r>
-              <a:rPr lang="de-DE">
-                <a:sym typeface="Wingdings" pitchFamily="2" charset="2"/>
-              </a:rPr>
-              <a:t>Find </a:t>
-            </a:r>
-            <a:r>
-              <a:rPr lang="de-DE" b="1">
-                <a:sym typeface="Wingdings" pitchFamily="2" charset="2"/>
-              </a:rPr>
-              <a:t>considerably lower loss </a:t>
-            </a:r>
-            <a:r>
-              <a:rPr lang="de-DE">
-                <a:sym typeface="Wingdings" pitchFamily="2" charset="2"/>
-              </a:rPr>
-              <a:t>on training and validation samples, compared to all other models on ultra sparse inputs.</a:t>
-            </a:r>
-          </a:p>
-          <a:p>
-            <a:pPr marL="285750" indent="-285750">
-              <a:buFont typeface="Arial" panose="020B0604020202020204" pitchFamily="34" charset="0"/>
-              <a:buChar char="•"/>
-            </a:pPr>
-            <a:r>
-              <a:rPr lang="de-DE">
-                <a:sym typeface="Wingdings" pitchFamily="2" charset="2"/>
-              </a:rPr>
-              <a:t>Proofs, that we can reconstruct full information from ultra sparse inputs, if we </a:t>
-            </a:r>
-            <a:r>
-              <a:rPr lang="de-DE" b="1">
-                <a:sym typeface="Wingdings" pitchFamily="2" charset="2"/>
-              </a:rPr>
-              <a:t>include the „right“ grid points</a:t>
-            </a:r>
-            <a:r>
-              <a:rPr lang="de-DE">
-                <a:sym typeface="Wingdings" pitchFamily="2" charset="2"/>
-              </a:rPr>
-              <a:t>!</a:t>
-            </a:r>
-          </a:p>
-        </p:txBody>
-      </p:sp>
-      <p:sp>
-        <p:nvSpPr>
-          <p:cNvPr id="3" name="Textfeld 2">
-            <a:extLst>
-              <a:ext uri="{FF2B5EF4-FFF2-40B4-BE49-F238E27FC236}">
-                <a16:creationId xmlns:a16="http://schemas.microsoft.com/office/drawing/2014/main" id="{C318182B-364D-C9F7-D1BC-5FD4D9781852}"/>
-              </a:ext>
-            </a:extLst>
-          </p:cNvPr>
-          <p:cNvSpPr txBox="1"/>
-          <p:nvPr/>
-        </p:nvSpPr>
-        <p:spPr>
-          <a:xfrm>
-            <a:off x="193812" y="148283"/>
-            <a:ext cx="8468274" cy="400110"/>
-          </a:xfrm>
-          <a:prstGeom prst="rect">
-            <a:avLst/>
-          </a:prstGeom>
-          <a:noFill/>
-        </p:spPr>
-        <p:txBody>
-          <a:bodyPr wrap="square" rtlCol="0">
-            <a:spAutoFit/>
-          </a:bodyPr>
-          <a:lstStyle/>
-          <a:p>
             <a:r>
               <a:rPr lang="de-DE" sz="2000" b="1"/>
               <a:t>Aim to find the optimal bottom-up sampling strategy for ultra sparse inputs</a:t>
@@ -5310,14 +5477,14 @@
           <p:nvPr/>
         </p:nvPicPr>
         <p:blipFill>
-          <a:blip r:embed="rId2"/>
+          <a:blip r:embed="rId3"/>
           <a:stretch>
             <a:fillRect/>
           </a:stretch>
         </p:blipFill>
         <p:spPr>
           <a:xfrm>
-            <a:off x="1231780" y="1812682"/>
+            <a:off x="1268850" y="3060714"/>
             <a:ext cx="8468274" cy="2866031"/>
           </a:xfrm>
           <a:prstGeom prst="rect">
@@ -5803,7 +5970,7 @@
               <a:rPr lang="de-DE" b="1">
                 <a:sym typeface="Wingdings" pitchFamily="2" charset="2"/>
               </a:rPr>
-              <a:t>23 grip points </a:t>
+              <a:t>23 grid points </a:t>
             </a:r>
             <a:r>
               <a:rPr lang="de-DE">
@@ -7396,7 +7563,7 @@
         <p:spPr>
           <a:xfrm>
             <a:off x="181343" y="675644"/>
-            <a:ext cx="11829313" cy="923330"/>
+            <a:ext cx="11829313" cy="1477328"/>
           </a:xfrm>
           <a:prstGeom prst="rect">
             <a:avLst/>
@@ -7417,19 +7584,19 @@
               <a:rPr lang="de-DE">
                 <a:sym typeface="Wingdings" pitchFamily="2" charset="2"/>
               </a:rPr>
-              <a:t>On the first sight: For reconstruction of SST samples, </a:t>
+              <a:t>As </a:t>
             </a:r>
             <a:r>
               <a:rPr lang="de-DE" b="1">
                 <a:sym typeface="Wingdings" pitchFamily="2" charset="2"/>
               </a:rPr>
-              <a:t>we need more inputs</a:t>
+              <a:t>evaluation metric </a:t>
             </a:r>
             <a:r>
               <a:rPr lang="de-DE">
                 <a:sym typeface="Wingdings" pitchFamily="2" charset="2"/>
               </a:rPr>
-              <a:t>!</a:t>
+              <a:t>(or uncertainty measure), compare several climate indices, computed on reconstruction vs. complete samples.  mse, correlation?</a:t>
             </a:r>
           </a:p>
           <a:p>
@@ -7441,19 +7608,19 @@
               <a:rPr lang="de-DE">
                 <a:sym typeface="Wingdings" pitchFamily="2" charset="2"/>
               </a:rPr>
-              <a:t>This is expected, due to </a:t>
+              <a:t>And open the black bock: Pick single samples and </a:t>
             </a:r>
             <a:r>
               <a:rPr lang="de-DE" b="1">
                 <a:sym typeface="Wingdings" pitchFamily="2" charset="2"/>
               </a:rPr>
-              <a:t>smaller spatial scales </a:t>
+              <a:t>visualize selected feature maps </a:t>
             </a:r>
             <a:r>
               <a:rPr lang="de-DE">
                 <a:sym typeface="Wingdings" pitchFamily="2" charset="2"/>
               </a:rPr>
-              <a:t>for processes in the Ocean, compared to the atmosphere.</a:t>
+              <a:t>of U-Net in all stages. Investigate, how model reconstructs complete information. Also visualize patches, that lead to TOPn activations.</a:t>
             </a:r>
           </a:p>
           <a:p>
@@ -7497,83 +7664,12 @@
           <a:p>
             <a:r>
               <a:rPr lang="de-DE" sz="2000" b="1"/>
-              <a:t>Next: </a:t>
-            </a:r>
-            <a:r>
-              <a:rPr lang="de-DE" sz="2000"/>
-              <a:t>Investigate </a:t>
-            </a:r>
-            <a:r>
-              <a:rPr lang="de-DE" sz="2000" b="1"/>
-              <a:t>sea surface temperature </a:t>
-            </a:r>
-            <a:r>
-              <a:rPr lang="de-DE" sz="2000"/>
-              <a:t>(SST) anomaly fields from CESM</a:t>
-            </a:r>
-          </a:p>
-        </p:txBody>
-      </p:sp>
-      <p:pic>
-        <p:nvPicPr>
-          <p:cNvPr id="2" name="Grafik 1">
-            <a:extLst>
-              <a:ext uri="{FF2B5EF4-FFF2-40B4-BE49-F238E27FC236}">
-                <a16:creationId xmlns:a16="http://schemas.microsoft.com/office/drawing/2014/main" id="{20E8D067-9B70-BA3E-9941-FDCD7CDCCF58}"/>
-              </a:ext>
-            </a:extLst>
-          </p:cNvPr>
-          <p:cNvPicPr>
-            <a:picLocks noChangeAspect="1"/>
-          </p:cNvPicPr>
-          <p:nvPr/>
-        </p:nvPicPr>
-        <p:blipFill>
-          <a:blip r:embed="rId2"/>
-          <a:stretch>
-            <a:fillRect/>
-          </a:stretch>
-        </p:blipFill>
-        <p:spPr>
-          <a:xfrm>
-            <a:off x="1138237" y="4271718"/>
-            <a:ext cx="7772400" cy="2554309"/>
-          </a:xfrm>
-          <a:prstGeom prst="rect">
-            <a:avLst/>
-          </a:prstGeom>
-        </p:spPr>
-      </p:pic>
-      <p:pic>
-        <p:nvPicPr>
-          <p:cNvPr id="7" name="Grafik 6">
-            <a:extLst>
-              <a:ext uri="{FF2B5EF4-FFF2-40B4-BE49-F238E27FC236}">
-                <a16:creationId xmlns:a16="http://schemas.microsoft.com/office/drawing/2014/main" id="{45F37F28-FEA6-7A26-41EC-FB82EDAAF43B}"/>
-              </a:ext>
-            </a:extLst>
-          </p:cNvPr>
-          <p:cNvPicPr>
-            <a:picLocks noChangeAspect="1"/>
-          </p:cNvPicPr>
-          <p:nvPr/>
-        </p:nvPicPr>
-        <p:blipFill>
-          <a:blip r:embed="rId3"/>
-          <a:stretch>
-            <a:fillRect/>
-          </a:stretch>
-        </p:blipFill>
-        <p:spPr>
-          <a:xfrm>
-            <a:off x="1137061" y="1571025"/>
-            <a:ext cx="7772400" cy="2587730"/>
-          </a:xfrm>
-          <a:prstGeom prst="rect">
-            <a:avLst/>
-          </a:prstGeom>
-        </p:spPr>
-      </p:pic>
+              <a:t>Missing experiments for SLP CESM samples:</a:t>
+            </a:r>
+            <a:endParaRPr lang="de-DE" sz="2000"/>
+          </a:p>
+        </p:txBody>
+      </p:sp>
     </p:spTree>
     <p:extLst>
       <p:ext uri="{BB962C8B-B14F-4D97-AF65-F5344CB8AC3E}">
@@ -7864,6 +7960,229 @@
     <p:extLst>
       <p:ext uri="{BB962C8B-B14F-4D97-AF65-F5344CB8AC3E}">
         <p14:creationId xmlns:p14="http://schemas.microsoft.com/office/powerpoint/2010/main" val="1252354762"/>
+      </p:ext>
+    </p:extLst>
+  </p:cSld>
+  <p:clrMapOvr>
+    <a:masterClrMapping/>
+  </p:clrMapOvr>
+</p:sld>
+</file>
+
+<file path=ppt/slides/slide20.xml><?xml version="1.0" encoding="utf-8"?>
+<p:sld xmlns:a="http://schemas.openxmlformats.org/drawingml/2006/main" xmlns:r="http://schemas.openxmlformats.org/officeDocument/2006/relationships" xmlns:p="http://schemas.openxmlformats.org/presentationml/2006/main">
+  <p:cSld>
+    <p:spTree>
+      <p:nvGrpSpPr>
+        <p:cNvPr id="1" name=""/>
+        <p:cNvGrpSpPr/>
+        <p:nvPr/>
+      </p:nvGrpSpPr>
+      <p:grpSpPr>
+        <a:xfrm>
+          <a:off x="0" y="0"/>
+          <a:ext cx="0" cy="0"/>
+          <a:chOff x="0" y="0"/>
+          <a:chExt cx="0" cy="0"/>
+        </a:xfrm>
+      </p:grpSpPr>
+      <p:sp>
+        <p:nvSpPr>
+          <p:cNvPr id="6" name="Textfeld 5">
+            <a:extLst>
+              <a:ext uri="{FF2B5EF4-FFF2-40B4-BE49-F238E27FC236}">
+                <a16:creationId xmlns:a16="http://schemas.microsoft.com/office/drawing/2014/main" id="{43BDBBCA-2D64-E13D-E511-E8953ECB5E22}"/>
+              </a:ext>
+            </a:extLst>
+          </p:cNvPr>
+          <p:cNvSpPr txBox="1"/>
+          <p:nvPr/>
+        </p:nvSpPr>
+        <p:spPr>
+          <a:xfrm>
+            <a:off x="181343" y="675644"/>
+            <a:ext cx="11829313" cy="923330"/>
+          </a:xfrm>
+          <a:prstGeom prst="rect">
+            <a:avLst/>
+          </a:prstGeom>
+          <a:noFill/>
+        </p:spPr>
+        <p:txBody>
+          <a:bodyPr wrap="square" rtlCol="0">
+            <a:spAutoFit/>
+          </a:bodyPr>
+          <a:lstStyle/>
+          <a:p>
+            <a:pPr marL="285750" indent="-285750">
+              <a:buFont typeface="Arial" panose="020B0604020202020204" pitchFamily="34" charset="0"/>
+              <a:buChar char="•"/>
+            </a:pPr>
+            <a:r>
+              <a:rPr lang="de-DE">
+                <a:sym typeface="Wingdings" pitchFamily="2" charset="2"/>
+              </a:rPr>
+              <a:t>On the first sight: For reconstruction of SST samples, </a:t>
+            </a:r>
+            <a:r>
+              <a:rPr lang="de-DE" b="1">
+                <a:sym typeface="Wingdings" pitchFamily="2" charset="2"/>
+              </a:rPr>
+              <a:t>we need more inputs</a:t>
+            </a:r>
+            <a:r>
+              <a:rPr lang="de-DE">
+                <a:sym typeface="Wingdings" pitchFamily="2" charset="2"/>
+              </a:rPr>
+              <a:t>!</a:t>
+            </a:r>
+          </a:p>
+          <a:p>
+            <a:pPr marL="285750" indent="-285750">
+              <a:buFont typeface="Arial" panose="020B0604020202020204" pitchFamily="34" charset="0"/>
+              <a:buChar char="•"/>
+            </a:pPr>
+            <a:r>
+              <a:rPr lang="de-DE">
+                <a:sym typeface="Wingdings" pitchFamily="2" charset="2"/>
+              </a:rPr>
+              <a:t>This is expected, due to </a:t>
+            </a:r>
+            <a:r>
+              <a:rPr lang="de-DE" b="1">
+                <a:sym typeface="Wingdings" pitchFamily="2" charset="2"/>
+              </a:rPr>
+              <a:t>smaller spatial scales </a:t>
+            </a:r>
+            <a:r>
+              <a:rPr lang="de-DE">
+                <a:sym typeface="Wingdings" pitchFamily="2" charset="2"/>
+              </a:rPr>
+              <a:t>for processes in the Ocean, compared to the atmosphere.</a:t>
+            </a:r>
+          </a:p>
+          <a:p>
+            <a:pPr marL="285750" indent="-285750">
+              <a:buFont typeface="Arial" panose="020B0604020202020204" pitchFamily="34" charset="0"/>
+              <a:buChar char="•"/>
+            </a:pPr>
+            <a:endParaRPr lang="de-DE">
+              <a:sym typeface="Wingdings" pitchFamily="2" charset="2"/>
+            </a:endParaRPr>
+          </a:p>
+        </p:txBody>
+      </p:sp>
+      <p:sp>
+        <p:nvSpPr>
+          <p:cNvPr id="3" name="Textfeld 2">
+            <a:extLst>
+              <a:ext uri="{FF2B5EF4-FFF2-40B4-BE49-F238E27FC236}">
+                <a16:creationId xmlns:a16="http://schemas.microsoft.com/office/drawing/2014/main" id="{C318182B-364D-C9F7-D1BC-5FD4D9781852}"/>
+              </a:ext>
+            </a:extLst>
+          </p:cNvPr>
+          <p:cNvSpPr txBox="1"/>
+          <p:nvPr/>
+        </p:nvSpPr>
+        <p:spPr>
+          <a:xfrm>
+            <a:off x="193812" y="148283"/>
+            <a:ext cx="8468274" cy="400110"/>
+          </a:xfrm>
+          <a:prstGeom prst="rect">
+            <a:avLst/>
+          </a:prstGeom>
+          <a:noFill/>
+        </p:spPr>
+        <p:txBody>
+          <a:bodyPr wrap="square" rtlCol="0">
+            <a:spAutoFit/>
+          </a:bodyPr>
+          <a:lstStyle/>
+          <a:p>
+            <a:r>
+              <a:rPr lang="de-DE" sz="2000" b="1"/>
+              <a:t>Next: </a:t>
+            </a:r>
+            <a:r>
+              <a:rPr lang="de-DE" sz="2000"/>
+              <a:t>Investigate </a:t>
+            </a:r>
+            <a:r>
+              <a:rPr lang="de-DE" sz="2000" b="1"/>
+              <a:t>sea surface temperature </a:t>
+            </a:r>
+            <a:r>
+              <a:rPr lang="de-DE" sz="2000"/>
+              <a:t>(SST) anomaly fields from CESM</a:t>
+            </a:r>
+          </a:p>
+        </p:txBody>
+      </p:sp>
+      <p:pic>
+        <p:nvPicPr>
+          <p:cNvPr id="2" name="Grafik 1">
+            <a:extLst>
+              <a:ext uri="{FF2B5EF4-FFF2-40B4-BE49-F238E27FC236}">
+                <a16:creationId xmlns:a16="http://schemas.microsoft.com/office/drawing/2014/main" id="{20E8D067-9B70-BA3E-9941-FDCD7CDCCF58}"/>
+              </a:ext>
+            </a:extLst>
+          </p:cNvPr>
+          <p:cNvPicPr>
+            <a:picLocks noChangeAspect="1"/>
+          </p:cNvPicPr>
+          <p:nvPr/>
+        </p:nvPicPr>
+        <p:blipFill>
+          <a:blip r:embed="rId2"/>
+          <a:stretch>
+            <a:fillRect/>
+          </a:stretch>
+        </p:blipFill>
+        <p:spPr>
+          <a:xfrm>
+            <a:off x="1137061" y="4303691"/>
+            <a:ext cx="7772400" cy="2554309"/>
+          </a:xfrm>
+          <a:prstGeom prst="rect">
+            <a:avLst/>
+          </a:prstGeom>
+        </p:spPr>
+      </p:pic>
+      <p:pic>
+        <p:nvPicPr>
+          <p:cNvPr id="7" name="Grafik 6">
+            <a:extLst>
+              <a:ext uri="{FF2B5EF4-FFF2-40B4-BE49-F238E27FC236}">
+                <a16:creationId xmlns:a16="http://schemas.microsoft.com/office/drawing/2014/main" id="{45F37F28-FEA6-7A26-41EC-FB82EDAAF43B}"/>
+              </a:ext>
+            </a:extLst>
+          </p:cNvPr>
+          <p:cNvPicPr>
+            <a:picLocks noChangeAspect="1"/>
+          </p:cNvPicPr>
+          <p:nvPr/>
+        </p:nvPicPr>
+        <p:blipFill>
+          <a:blip r:embed="rId3"/>
+          <a:stretch>
+            <a:fillRect/>
+          </a:stretch>
+        </p:blipFill>
+        <p:spPr>
+          <a:xfrm>
+            <a:off x="1137061" y="1657467"/>
+            <a:ext cx="7772400" cy="2587730"/>
+          </a:xfrm>
+          <a:prstGeom prst="rect">
+            <a:avLst/>
+          </a:prstGeom>
+        </p:spPr>
+      </p:pic>
+    </p:spTree>
+    <p:extLst>
+      <p:ext uri="{BB962C8B-B14F-4D97-AF65-F5344CB8AC3E}">
+        <p14:creationId xmlns:p14="http://schemas.microsoft.com/office/powerpoint/2010/main" val="4118534445"/>
       </p:ext>
     </p:extLst>
   </p:cSld>
@@ -11726,8 +12045,8 @@
           </a:prstGeom>
         </p:spPr>
       </p:pic>
-      <mc:AlternateContent xmlns:mc="http://schemas.openxmlformats.org/markup-compatibility/2006">
-        <mc:Choice xmlns:a14="http://schemas.microsoft.com/office/drawing/2010/main" Requires="a14">
+      <mc:AlternateContent xmlns:mc="http://schemas.openxmlformats.org/markup-compatibility/2006" xmlns:a14="http://schemas.microsoft.com/office/drawing/2010/main">
+        <mc:Choice Requires="a14">
           <p:sp>
             <p:nvSpPr>
               <p:cNvPr id="14" name="Textfeld 13">
@@ -11809,7 +12128,7 @@
             </p:txBody>
           </p:sp>
         </mc:Choice>
-        <mc:Fallback>
+        <mc:Fallback xmlns="">
           <p:sp>
             <p:nvSpPr>
               <p:cNvPr id="14" name="Textfeld 13">
@@ -12133,8 +12452,8 @@
           </a:p>
         </p:txBody>
       </p:sp>
-      <mc:AlternateContent xmlns:mc="http://schemas.openxmlformats.org/markup-compatibility/2006">
-        <mc:Choice xmlns:a14="http://schemas.microsoft.com/office/drawing/2010/main" Requires="a14">
+      <mc:AlternateContent xmlns:mc="http://schemas.openxmlformats.org/markup-compatibility/2006" xmlns:a14="http://schemas.microsoft.com/office/drawing/2010/main">
+        <mc:Choice Requires="a14">
           <p:sp>
             <p:nvSpPr>
               <p:cNvPr id="6" name="Textfeld 5">
@@ -12192,7 +12511,7 @@
             </p:txBody>
           </p:sp>
         </mc:Choice>
-        <mc:Fallback>
+        <mc:Fallback xmlns="">
           <p:sp>
             <p:nvSpPr>
               <p:cNvPr id="6" name="Textfeld 5">
@@ -12237,8 +12556,8 @@
           </p:sp>
         </mc:Fallback>
       </mc:AlternateContent>
-      <mc:AlternateContent xmlns:mc="http://schemas.openxmlformats.org/markup-compatibility/2006">
-        <mc:Choice xmlns:a14="http://schemas.microsoft.com/office/drawing/2010/main" Requires="a14">
+      <mc:AlternateContent xmlns:mc="http://schemas.openxmlformats.org/markup-compatibility/2006" xmlns:a14="http://schemas.microsoft.com/office/drawing/2010/main">
+        <mc:Choice Requires="a14">
           <p:graphicFrame>
             <p:nvGraphicFramePr>
               <p:cNvPr id="8" name="Tabelle 8">
@@ -13111,7 +13430,7 @@
             </a:graphic>
           </p:graphicFrame>
         </mc:Choice>
-        <mc:Fallback>
+        <mc:Fallback xmlns="">
           <p:graphicFrame>
             <p:nvGraphicFramePr>
               <p:cNvPr id="8" name="Tabelle 8">
@@ -13738,8 +14057,8 @@
           </a:p>
         </p:txBody>
       </p:sp>
-      <mc:AlternateContent xmlns:mc="http://schemas.openxmlformats.org/markup-compatibility/2006">
-        <mc:Choice xmlns:a14="http://schemas.microsoft.com/office/drawing/2010/main" Requires="a14">
+      <mc:AlternateContent xmlns:mc="http://schemas.openxmlformats.org/markup-compatibility/2006" xmlns:a14="http://schemas.microsoft.com/office/drawing/2010/main">
+        <mc:Choice Requires="a14">
           <p:sp>
             <p:nvSpPr>
               <p:cNvPr id="2" name="Textfeld 1">
@@ -13835,7 +14154,7 @@
             </p:txBody>
           </p:sp>
         </mc:Choice>
-        <mc:Fallback>
+        <mc:Fallback xmlns="">
           <p:sp>
             <p:nvSpPr>
               <p:cNvPr id="2" name="Textfeld 1">

</xml_diff>

<commit_message>
Check reconstructions of final models and DINEOF for selected slp and sst RW samples (#31)
</commit_message>
<xml_diff>
--- a/presentations/20230202_unet_4conv_slp_CESM_results_and_storyline.pptx
+++ b/presentations/20230202_unet_4conv_slp_CESM_results_and_storyline.pptx
@@ -5,7 +5,7 @@
     <p:sldMasterId id="2147483648" r:id="rId1"/>
   </p:sldMasterIdLst>
   <p:notesMasterIdLst>
-    <p:notesMasterId r:id="rId21"/>
+    <p:notesMasterId r:id="rId22"/>
   </p:notesMasterIdLst>
   <p:sldIdLst>
     <p:sldId id="256" r:id="rId2"/>
@@ -27,6 +27,7 @@
     <p:sldId id="279" r:id="rId18"/>
     <p:sldId id="280" r:id="rId19"/>
     <p:sldId id="281" r:id="rId20"/>
+    <p:sldId id="284" r:id="rId21"/>
   </p:sldIdLst>
   <p:sldSz cx="12192000" cy="6858000"/>
   <p:notesSz cx="6858000" cy="9144000"/>
@@ -214,7 +215,7 @@
           </a:lstStyle>
           <a:p>
             <a:fld id="{B35BE548-DE05-8149-9395-93E03CC73C13}" type="datetimeFigureOut">
-              <a:t>02.02.23</a:t>
+              <a:t>03.02.23</a:t>
             </a:fld>
             <a:endParaRPr lang="de-DE"/>
           </a:p>
@@ -794,7 +795,7 @@
           <a:lstStyle/>
           <a:p>
             <a:fld id="{F7A3446A-3617-0E4A-A439-6DD0C73FFDE1}" type="datetimeFigureOut">
-              <a:t>02.02.23</a:t>
+              <a:t>03.02.23</a:t>
             </a:fld>
             <a:endParaRPr lang="de-DE"/>
           </a:p>
@@ -990,7 +991,7 @@
           <a:lstStyle/>
           <a:p>
             <a:fld id="{F7A3446A-3617-0E4A-A439-6DD0C73FFDE1}" type="datetimeFigureOut">
-              <a:t>02.02.23</a:t>
+              <a:t>03.02.23</a:t>
             </a:fld>
             <a:endParaRPr lang="de-DE"/>
           </a:p>
@@ -1196,7 +1197,7 @@
           <a:lstStyle/>
           <a:p>
             <a:fld id="{F7A3446A-3617-0E4A-A439-6DD0C73FFDE1}" type="datetimeFigureOut">
-              <a:t>02.02.23</a:t>
+              <a:t>03.02.23</a:t>
             </a:fld>
             <a:endParaRPr lang="de-DE"/>
           </a:p>
@@ -1392,7 +1393,7 @@
           <a:lstStyle/>
           <a:p>
             <a:fld id="{F7A3446A-3617-0E4A-A439-6DD0C73FFDE1}" type="datetimeFigureOut">
-              <a:t>02.02.23</a:t>
+              <a:t>03.02.23</a:t>
             </a:fld>
             <a:endParaRPr lang="de-DE"/>
           </a:p>
@@ -1665,7 +1666,7 @@
           <a:lstStyle/>
           <a:p>
             <a:fld id="{F7A3446A-3617-0E4A-A439-6DD0C73FFDE1}" type="datetimeFigureOut">
-              <a:t>02.02.23</a:t>
+              <a:t>03.02.23</a:t>
             </a:fld>
             <a:endParaRPr lang="de-DE"/>
           </a:p>
@@ -1928,7 +1929,7 @@
           <a:lstStyle/>
           <a:p>
             <a:fld id="{F7A3446A-3617-0E4A-A439-6DD0C73FFDE1}" type="datetimeFigureOut">
-              <a:t>02.02.23</a:t>
+              <a:t>03.02.23</a:t>
             </a:fld>
             <a:endParaRPr lang="de-DE"/>
           </a:p>
@@ -2338,7 +2339,7 @@
           <a:lstStyle/>
           <a:p>
             <a:fld id="{F7A3446A-3617-0E4A-A439-6DD0C73FFDE1}" type="datetimeFigureOut">
-              <a:t>02.02.23</a:t>
+              <a:t>03.02.23</a:t>
             </a:fld>
             <a:endParaRPr lang="de-DE"/>
           </a:p>
@@ -2477,7 +2478,7 @@
           <a:lstStyle/>
           <a:p>
             <a:fld id="{F7A3446A-3617-0E4A-A439-6DD0C73FFDE1}" type="datetimeFigureOut">
-              <a:t>02.02.23</a:t>
+              <a:t>03.02.23</a:t>
             </a:fld>
             <a:endParaRPr lang="de-DE"/>
           </a:p>
@@ -2588,7 +2589,7 @@
           <a:lstStyle/>
           <a:p>
             <a:fld id="{F7A3446A-3617-0E4A-A439-6DD0C73FFDE1}" type="datetimeFigureOut">
-              <a:t>02.02.23</a:t>
+              <a:t>03.02.23</a:t>
             </a:fld>
             <a:endParaRPr lang="de-DE"/>
           </a:p>
@@ -2897,7 +2898,7 @@
           <a:lstStyle/>
           <a:p>
             <a:fld id="{F7A3446A-3617-0E4A-A439-6DD0C73FFDE1}" type="datetimeFigureOut">
-              <a:t>02.02.23</a:t>
+              <a:t>03.02.23</a:t>
             </a:fld>
             <a:endParaRPr lang="de-DE"/>
           </a:p>
@@ -3183,7 +3184,7 @@
           <a:lstStyle/>
           <a:p>
             <a:fld id="{F7A3446A-3617-0E4A-A439-6DD0C73FFDE1}" type="datetimeFigureOut">
-              <a:t>02.02.23</a:t>
+              <a:t>03.02.23</a:t>
             </a:fld>
             <a:endParaRPr lang="de-DE"/>
           </a:p>
@@ -3422,7 +3423,7 @@
           </a:lstStyle>
           <a:p>
             <a:fld id="{F7A3446A-3617-0E4A-A439-6DD0C73FFDE1}" type="datetimeFigureOut">
-              <a:t>02.02.23</a:t>
+              <a:t>03.02.23</a:t>
             </a:fld>
             <a:endParaRPr lang="de-DE"/>
           </a:p>
@@ -5165,12 +5166,273 @@
           <a:chExt cx="0" cy="0"/>
         </a:xfrm>
       </p:grpSpPr>
-      <p:sp>
-        <p:nvSpPr>
-          <p:cNvPr id="6" name="Textfeld 5">
-            <a:extLst>
-              <a:ext uri="{FF2B5EF4-FFF2-40B4-BE49-F238E27FC236}">
-                <a16:creationId xmlns:a16="http://schemas.microsoft.com/office/drawing/2014/main" id="{43BDBBCA-2D64-E13D-E511-E8953ECB5E22}"/>
+      <mc:AlternateContent xmlns:mc="http://schemas.openxmlformats.org/markup-compatibility/2006">
+        <mc:Choice xmlns:a14="http://schemas.microsoft.com/office/drawing/2010/main" Requires="a14">
+          <p:sp>
+            <p:nvSpPr>
+              <p:cNvPr id="6" name="Textfeld 5">
+                <a:extLst>
+                  <a:ext uri="{FF2B5EF4-FFF2-40B4-BE49-F238E27FC236}">
+                    <a16:creationId xmlns:a16="http://schemas.microsoft.com/office/drawing/2014/main" id="{43BDBBCA-2D64-E13D-E511-E8953ECB5E22}"/>
+                  </a:ext>
+                </a:extLst>
+              </p:cNvPr>
+              <p:cNvSpPr txBox="1"/>
+              <p:nvPr/>
+            </p:nvSpPr>
+            <p:spPr>
+              <a:xfrm>
+                <a:off x="181343" y="772262"/>
+                <a:ext cx="11829313" cy="1745863"/>
+              </a:xfrm>
+              <a:prstGeom prst="rect">
+                <a:avLst/>
+              </a:prstGeom>
+              <a:noFill/>
+            </p:spPr>
+            <p:txBody>
+              <a:bodyPr wrap="square" rtlCol="0">
+                <a:spAutoFit/>
+              </a:bodyPr>
+              <a:lstStyle/>
+              <a:p>
+                <a:pPr marL="285750" indent="-285750">
+                  <a:buFont typeface="Arial" panose="020B0604020202020204" pitchFamily="34" charset="0"/>
+                  <a:buChar char="•"/>
+                </a:pPr>
+                <a:r>
+                  <a:rPr lang="de-DE" b="1">
+                    <a:sym typeface="Wingdings" pitchFamily="2" charset="2"/>
+                  </a:rPr>
+                  <a:t>Train models with these fixed optimal masks </a:t>
+                </a:r>
+                <a:r>
+                  <a:rPr lang="de-DE">
+                    <a:sym typeface="Wingdings" pitchFamily="2" charset="2"/>
+                  </a:rPr>
+                  <a:t>of only 14 and 138 grid points, relating to 99.9% and 99% missing values.</a:t>
+                </a:r>
+              </a:p>
+              <a:p>
+                <a:pPr marL="285750" indent="-285750">
+                  <a:buFont typeface="Arial" panose="020B0604020202020204" pitchFamily="34" charset="0"/>
+                  <a:buChar char="•"/>
+                </a:pPr>
+                <a:r>
+                  <a:rPr lang="de-DE">
+                    <a:sym typeface="Wingdings" pitchFamily="2" charset="2"/>
+                  </a:rPr>
+                  <a:t>Find </a:t>
+                </a:r>
+                <a:r>
+                  <a:rPr lang="de-DE" b="1">
+                    <a:sym typeface="Wingdings" pitchFamily="2" charset="2"/>
+                  </a:rPr>
+                  <a:t>considerably lower loss </a:t>
+                </a:r>
+                <a:r>
+                  <a:rPr lang="de-DE">
+                    <a:sym typeface="Wingdings" pitchFamily="2" charset="2"/>
+                  </a:rPr>
+                  <a:t>on training and validation samples, compared to all other models on ultra sparse inputs.</a:t>
+                </a:r>
+              </a:p>
+              <a:p>
+                <a:pPr marL="285750" indent="-285750">
+                  <a:buFont typeface="Arial" panose="020B0604020202020204" pitchFamily="34" charset="0"/>
+                  <a:buChar char="•"/>
+                </a:pPr>
+                <a:r>
+                  <a:rPr lang="de-DE">
+                    <a:sym typeface="Wingdings" pitchFamily="2" charset="2"/>
+                  </a:rPr>
+                  <a:t>Proofs, that we can reconstruct full information from ultra sparse inputs, if we </a:t>
+                </a:r>
+                <a:r>
+                  <a:rPr lang="de-DE" b="1">
+                    <a:sym typeface="Wingdings" pitchFamily="2" charset="2"/>
+                  </a:rPr>
+                  <a:t>include the „right“ grid points</a:t>
+                </a:r>
+                <a:r>
+                  <a:rPr lang="de-DE">
+                    <a:sym typeface="Wingdings" pitchFamily="2" charset="2"/>
+                  </a:rPr>
+                  <a:t>!</a:t>
+                </a:r>
+              </a:p>
+              <a:p>
+                <a:pPr marL="285750" indent="-285750">
+                  <a:buFont typeface="Arial" panose="020B0604020202020204" pitchFamily="34" charset="0"/>
+                  <a:buChar char="•"/>
+                </a:pPr>
+                <a:r>
+                  <a:rPr lang="de-DE">
+                    <a:sym typeface="Wingdings" pitchFamily="2" charset="2"/>
+                  </a:rPr>
+                  <a:t>Note: We could have – by coincidence – found the optimal mask with randomly picking 14 grid points in our ‚fixed‘ mask model. But chances are </a:t>
+                </a:r>
+                <a14:m>
+                  <m:oMath xmlns:m="http://schemas.openxmlformats.org/officeDocument/2006/math">
+                    <m:f>
+                      <m:fPr>
+                        <m:ctrlPr>
+                          <a:rPr lang="de-DE" b="0" i="1">
+                            <a:latin typeface="Cambria Math" panose="02040503050406030204" pitchFamily="18" charset="0"/>
+                            <a:sym typeface="Wingdings" pitchFamily="2" charset="2"/>
+                          </a:rPr>
+                        </m:ctrlPr>
+                      </m:fPr>
+                      <m:num>
+                        <m:r>
+                          <a:rPr lang="de-DE" b="0" i="1">
+                            <a:latin typeface="Cambria Math" panose="02040503050406030204" pitchFamily="18" charset="0"/>
+                            <a:sym typeface="Wingdings" pitchFamily="2" charset="2"/>
+                          </a:rPr>
+                          <m:t>1</m:t>
+                        </m:r>
+                      </m:num>
+                      <m:den>
+                        <m:d>
+                          <m:dPr>
+                            <m:ctrlPr>
+                              <a:rPr lang="de-DE" i="1">
+                                <a:latin typeface="Cambria Math" panose="02040503050406030204" pitchFamily="18" charset="0"/>
+                                <a:sym typeface="Wingdings" pitchFamily="2" charset="2"/>
+                              </a:rPr>
+                            </m:ctrlPr>
+                          </m:dPr>
+                          <m:e>
+                            <m:eqArr>
+                              <m:eqArrPr>
+                                <m:ctrlPr>
+                                  <a:rPr lang="de-DE" b="0" i="1">
+                                    <a:latin typeface="Cambria Math" panose="02040503050406030204" pitchFamily="18" charset="0"/>
+                                    <a:sym typeface="Wingdings" pitchFamily="2" charset="2"/>
+                                  </a:rPr>
+                                </m:ctrlPr>
+                              </m:eqArrPr>
+                              <m:e>
+                                <m:r>
+                                  <a:rPr lang="de-DE" b="0" i="1">
+                                    <a:latin typeface="Cambria Math" panose="02040503050406030204" pitchFamily="18" charset="0"/>
+                                    <a:sym typeface="Wingdings" pitchFamily="2" charset="2"/>
+                                  </a:rPr>
+                                  <m:t>13,824</m:t>
+                                </m:r>
+                              </m:e>
+                              <m:e>
+                                <m:r>
+                                  <a:rPr lang="de-DE" b="0" i="1">
+                                    <a:latin typeface="Cambria Math" panose="02040503050406030204" pitchFamily="18" charset="0"/>
+                                    <a:sym typeface="Wingdings" pitchFamily="2" charset="2"/>
+                                  </a:rPr>
+                                  <m:t>14</m:t>
+                                </m:r>
+                              </m:e>
+                            </m:eqArr>
+                          </m:e>
+                        </m:d>
+                      </m:den>
+                    </m:f>
+                    <m:r>
+                      <a:rPr lang="de-DE" b="0" i="1">
+                        <a:latin typeface="Cambria Math" panose="02040503050406030204" pitchFamily="18" charset="0"/>
+                        <a:sym typeface="Wingdings" pitchFamily="2" charset="2"/>
+                      </a:rPr>
+                      <m:t>=</m:t>
+                    </m:r>
+                    <m:sSup>
+                      <m:sSupPr>
+                        <m:ctrlPr>
+                          <a:rPr lang="de-DE" b="0" i="1">
+                            <a:latin typeface="Cambria Math" panose="02040503050406030204" pitchFamily="18" charset="0"/>
+                            <a:sym typeface="Wingdings" pitchFamily="2" charset="2"/>
+                          </a:rPr>
+                        </m:ctrlPr>
+                      </m:sSupPr>
+                      <m:e>
+                        <m:r>
+                          <a:rPr lang="de-DE" b="0" i="1">
+                            <a:latin typeface="Cambria Math" panose="02040503050406030204" pitchFamily="18" charset="0"/>
+                            <a:sym typeface="Wingdings" pitchFamily="2" charset="2"/>
+                          </a:rPr>
+                          <m:t>10</m:t>
+                        </m:r>
+                      </m:e>
+                      <m:sup>
+                        <m:r>
+                          <a:rPr lang="de-DE" b="0" i="1">
+                            <a:latin typeface="Cambria Math" panose="02040503050406030204" pitchFamily="18" charset="0"/>
+                            <a:sym typeface="Wingdings" pitchFamily="2" charset="2"/>
+                          </a:rPr>
+                          <m:t>−47</m:t>
+                        </m:r>
+                      </m:sup>
+                    </m:sSup>
+                  </m:oMath>
+                </a14:m>
+                <a:r>
+                  <a:rPr lang="de-DE">
+                    <a:sym typeface="Wingdings" pitchFamily="2" charset="2"/>
+                  </a:rPr>
+                  <a:t>.</a:t>
+                </a:r>
+              </a:p>
+            </p:txBody>
+          </p:sp>
+        </mc:Choice>
+        <mc:Fallback>
+          <p:sp>
+            <p:nvSpPr>
+              <p:cNvPr id="6" name="Textfeld 5">
+                <a:extLst>
+                  <a:ext uri="{FF2B5EF4-FFF2-40B4-BE49-F238E27FC236}">
+                    <a16:creationId xmlns:a16="http://schemas.microsoft.com/office/drawing/2014/main" id="{43BDBBCA-2D64-E13D-E511-E8953ECB5E22}"/>
+                  </a:ext>
+                </a:extLst>
+              </p:cNvPr>
+              <p:cNvSpPr txBox="1">
+                <a:spLocks noRot="1" noChangeAspect="1" noMove="1" noResize="1" noEditPoints="1" noAdjustHandles="1" noChangeArrowheads="1" noChangeShapeType="1" noTextEdit="1"/>
+              </p:cNvSpPr>
+              <p:nvPr/>
+            </p:nvSpPr>
+            <p:spPr>
+              <a:xfrm>
+                <a:off x="181343" y="772262"/>
+                <a:ext cx="11829313" cy="1745863"/>
+              </a:xfrm>
+              <a:prstGeom prst="rect">
+                <a:avLst/>
+              </a:prstGeom>
+              <a:blipFill>
+                <a:blip r:embed="rId2"/>
+                <a:stretch>
+                  <a:fillRect l="-322" t="-1439"/>
+                </a:stretch>
+              </a:blipFill>
+            </p:spPr>
+            <p:txBody>
+              <a:bodyPr/>
+              <a:lstStyle/>
+              <a:p>
+                <a:r>
+                  <a:rPr lang="de-DE">
+                    <a:noFill/>
+                  </a:rPr>
+                  <a:t> </a:t>
+                </a:r>
+              </a:p>
+            </p:txBody>
+          </p:sp>
+        </mc:Fallback>
+      </mc:AlternateContent>
+      <p:sp>
+        <p:nvSpPr>
+          <p:cNvPr id="3" name="Textfeld 2">
+            <a:extLst>
+              <a:ext uri="{FF2B5EF4-FFF2-40B4-BE49-F238E27FC236}">
+                <a16:creationId xmlns:a16="http://schemas.microsoft.com/office/drawing/2014/main" id="{C318182B-364D-C9F7-D1BC-5FD4D9781852}"/>
               </a:ext>
             </a:extLst>
           </p:cNvPr>
@@ -5179,8 +5441,8 @@
         </p:nvSpPr>
         <p:spPr>
           <a:xfrm>
-            <a:off x="181343" y="772262"/>
-            <a:ext cx="11829313" cy="923330"/>
+            <a:off x="193812" y="148283"/>
+            <a:ext cx="8468274" cy="400110"/>
           </a:xfrm>
           <a:prstGeom prst="rect">
             <a:avLst/>
@@ -5193,101 +5455,6 @@
           </a:bodyPr>
           <a:lstStyle/>
           <a:p>
-            <a:pPr marL="285750" indent="-285750">
-              <a:buFont typeface="Arial" panose="020B0604020202020204" pitchFamily="34" charset="0"/>
-              <a:buChar char="•"/>
-            </a:pPr>
-            <a:r>
-              <a:rPr lang="de-DE" b="1">
-                <a:sym typeface="Wingdings" pitchFamily="2" charset="2"/>
-              </a:rPr>
-              <a:t>Train models with these fixed optimal masks </a:t>
-            </a:r>
-            <a:r>
-              <a:rPr lang="de-DE">
-                <a:sym typeface="Wingdings" pitchFamily="2" charset="2"/>
-              </a:rPr>
-              <a:t>of only 14 and 138 grid points, relating to 99.9% and 99% missing values.</a:t>
-            </a:r>
-          </a:p>
-          <a:p>
-            <a:pPr marL="285750" indent="-285750">
-              <a:buFont typeface="Arial" panose="020B0604020202020204" pitchFamily="34" charset="0"/>
-              <a:buChar char="•"/>
-            </a:pPr>
-            <a:r>
-              <a:rPr lang="de-DE">
-                <a:sym typeface="Wingdings" pitchFamily="2" charset="2"/>
-              </a:rPr>
-              <a:t>Find </a:t>
-            </a:r>
-            <a:r>
-              <a:rPr lang="de-DE" b="1">
-                <a:sym typeface="Wingdings" pitchFamily="2" charset="2"/>
-              </a:rPr>
-              <a:t>considerably lower loss </a:t>
-            </a:r>
-            <a:r>
-              <a:rPr lang="de-DE">
-                <a:sym typeface="Wingdings" pitchFamily="2" charset="2"/>
-              </a:rPr>
-              <a:t>on training and validation samples, compared to all other models on ultra sparse inputs.</a:t>
-            </a:r>
-          </a:p>
-          <a:p>
-            <a:pPr marL="285750" indent="-285750">
-              <a:buFont typeface="Arial" panose="020B0604020202020204" pitchFamily="34" charset="0"/>
-              <a:buChar char="•"/>
-            </a:pPr>
-            <a:r>
-              <a:rPr lang="de-DE">
-                <a:sym typeface="Wingdings" pitchFamily="2" charset="2"/>
-              </a:rPr>
-              <a:t>Proofs, that we can reconstruct full information from ultra sparse inputs, if we </a:t>
-            </a:r>
-            <a:r>
-              <a:rPr lang="de-DE" b="1">
-                <a:sym typeface="Wingdings" pitchFamily="2" charset="2"/>
-              </a:rPr>
-              <a:t>include the „right“ grid points</a:t>
-            </a:r>
-            <a:r>
-              <a:rPr lang="de-DE">
-                <a:sym typeface="Wingdings" pitchFamily="2" charset="2"/>
-              </a:rPr>
-              <a:t>!</a:t>
-            </a:r>
-          </a:p>
-        </p:txBody>
-      </p:sp>
-      <p:sp>
-        <p:nvSpPr>
-          <p:cNvPr id="3" name="Textfeld 2">
-            <a:extLst>
-              <a:ext uri="{FF2B5EF4-FFF2-40B4-BE49-F238E27FC236}">
-                <a16:creationId xmlns:a16="http://schemas.microsoft.com/office/drawing/2014/main" id="{C318182B-364D-C9F7-D1BC-5FD4D9781852}"/>
-              </a:ext>
-            </a:extLst>
-          </p:cNvPr>
-          <p:cNvSpPr txBox="1"/>
-          <p:nvPr/>
-        </p:nvSpPr>
-        <p:spPr>
-          <a:xfrm>
-            <a:off x="193812" y="148283"/>
-            <a:ext cx="8468274" cy="400110"/>
-          </a:xfrm>
-          <a:prstGeom prst="rect">
-            <a:avLst/>
-          </a:prstGeom>
-          <a:noFill/>
-        </p:spPr>
-        <p:txBody>
-          <a:bodyPr wrap="square" rtlCol="0">
-            <a:spAutoFit/>
-          </a:bodyPr>
-          <a:lstStyle/>
-          <a:p>
             <a:r>
               <a:rPr lang="de-DE" sz="2000" b="1"/>
               <a:t>Aim to find the optimal bottom-up sampling strategy for ultra sparse inputs</a:t>
@@ -5310,14 +5477,14 @@
           <p:nvPr/>
         </p:nvPicPr>
         <p:blipFill>
-          <a:blip r:embed="rId2"/>
+          <a:blip r:embed="rId3"/>
           <a:stretch>
             <a:fillRect/>
           </a:stretch>
         </p:blipFill>
         <p:spPr>
           <a:xfrm>
-            <a:off x="1231780" y="1812682"/>
+            <a:off x="1268850" y="3060714"/>
             <a:ext cx="8468274" cy="2866031"/>
           </a:xfrm>
           <a:prstGeom prst="rect">
@@ -5803,7 +5970,7 @@
               <a:rPr lang="de-DE" b="1">
                 <a:sym typeface="Wingdings" pitchFamily="2" charset="2"/>
               </a:rPr>
-              <a:t>23 grip points </a:t>
+              <a:t>23 grid points </a:t>
             </a:r>
             <a:r>
               <a:rPr lang="de-DE">
@@ -7396,7 +7563,7 @@
         <p:spPr>
           <a:xfrm>
             <a:off x="181343" y="675644"/>
-            <a:ext cx="11829313" cy="923330"/>
+            <a:ext cx="11829313" cy="1477328"/>
           </a:xfrm>
           <a:prstGeom prst="rect">
             <a:avLst/>
@@ -7417,19 +7584,19 @@
               <a:rPr lang="de-DE">
                 <a:sym typeface="Wingdings" pitchFamily="2" charset="2"/>
               </a:rPr>
-              <a:t>On the first sight: For reconstruction of SST samples, </a:t>
+              <a:t>As </a:t>
             </a:r>
             <a:r>
               <a:rPr lang="de-DE" b="1">
                 <a:sym typeface="Wingdings" pitchFamily="2" charset="2"/>
               </a:rPr>
-              <a:t>we need more inputs</a:t>
+              <a:t>evaluation metric </a:t>
             </a:r>
             <a:r>
               <a:rPr lang="de-DE">
                 <a:sym typeface="Wingdings" pitchFamily="2" charset="2"/>
               </a:rPr>
-              <a:t>!</a:t>
+              <a:t>(or uncertainty measure), compare several climate indices, computed on reconstruction vs. complete samples.  mse, correlation?</a:t>
             </a:r>
           </a:p>
           <a:p>
@@ -7441,19 +7608,19 @@
               <a:rPr lang="de-DE">
                 <a:sym typeface="Wingdings" pitchFamily="2" charset="2"/>
               </a:rPr>
-              <a:t>This is expected, due to </a:t>
+              <a:t>And open the black bock: Pick single samples and </a:t>
             </a:r>
             <a:r>
               <a:rPr lang="de-DE" b="1">
                 <a:sym typeface="Wingdings" pitchFamily="2" charset="2"/>
               </a:rPr>
-              <a:t>smaller spatial scales </a:t>
+              <a:t>visualize selected feature maps </a:t>
             </a:r>
             <a:r>
               <a:rPr lang="de-DE">
                 <a:sym typeface="Wingdings" pitchFamily="2" charset="2"/>
               </a:rPr>
-              <a:t>for processes in the Ocean, compared to the atmosphere.</a:t>
+              <a:t>of U-Net in all stages. Investigate, how model reconstructs complete information. Also visualize patches, that lead to TOPn activations.</a:t>
             </a:r>
           </a:p>
           <a:p>
@@ -7497,83 +7664,12 @@
           <a:p>
             <a:r>
               <a:rPr lang="de-DE" sz="2000" b="1"/>
-              <a:t>Next: </a:t>
-            </a:r>
-            <a:r>
-              <a:rPr lang="de-DE" sz="2000"/>
-              <a:t>Investigate </a:t>
-            </a:r>
-            <a:r>
-              <a:rPr lang="de-DE" sz="2000" b="1"/>
-              <a:t>sea surface temperature </a:t>
-            </a:r>
-            <a:r>
-              <a:rPr lang="de-DE" sz="2000"/>
-              <a:t>(SST) anomaly fields from CESM</a:t>
-            </a:r>
-          </a:p>
-        </p:txBody>
-      </p:sp>
-      <p:pic>
-        <p:nvPicPr>
-          <p:cNvPr id="2" name="Grafik 1">
-            <a:extLst>
-              <a:ext uri="{FF2B5EF4-FFF2-40B4-BE49-F238E27FC236}">
-                <a16:creationId xmlns:a16="http://schemas.microsoft.com/office/drawing/2014/main" id="{20E8D067-9B70-BA3E-9941-FDCD7CDCCF58}"/>
-              </a:ext>
-            </a:extLst>
-          </p:cNvPr>
-          <p:cNvPicPr>
-            <a:picLocks noChangeAspect="1"/>
-          </p:cNvPicPr>
-          <p:nvPr/>
-        </p:nvPicPr>
-        <p:blipFill>
-          <a:blip r:embed="rId2"/>
-          <a:stretch>
-            <a:fillRect/>
-          </a:stretch>
-        </p:blipFill>
-        <p:spPr>
-          <a:xfrm>
-            <a:off x="1138237" y="4271718"/>
-            <a:ext cx="7772400" cy="2554309"/>
-          </a:xfrm>
-          <a:prstGeom prst="rect">
-            <a:avLst/>
-          </a:prstGeom>
-        </p:spPr>
-      </p:pic>
-      <p:pic>
-        <p:nvPicPr>
-          <p:cNvPr id="7" name="Grafik 6">
-            <a:extLst>
-              <a:ext uri="{FF2B5EF4-FFF2-40B4-BE49-F238E27FC236}">
-                <a16:creationId xmlns:a16="http://schemas.microsoft.com/office/drawing/2014/main" id="{45F37F28-FEA6-7A26-41EC-FB82EDAAF43B}"/>
-              </a:ext>
-            </a:extLst>
-          </p:cNvPr>
-          <p:cNvPicPr>
-            <a:picLocks noChangeAspect="1"/>
-          </p:cNvPicPr>
-          <p:nvPr/>
-        </p:nvPicPr>
-        <p:blipFill>
-          <a:blip r:embed="rId3"/>
-          <a:stretch>
-            <a:fillRect/>
-          </a:stretch>
-        </p:blipFill>
-        <p:spPr>
-          <a:xfrm>
-            <a:off x="1137061" y="1571025"/>
-            <a:ext cx="7772400" cy="2587730"/>
-          </a:xfrm>
-          <a:prstGeom prst="rect">
-            <a:avLst/>
-          </a:prstGeom>
-        </p:spPr>
-      </p:pic>
+              <a:t>Missing experiments for SLP CESM samples:</a:t>
+            </a:r>
+            <a:endParaRPr lang="de-DE" sz="2000"/>
+          </a:p>
+        </p:txBody>
+      </p:sp>
     </p:spTree>
     <p:extLst>
       <p:ext uri="{BB962C8B-B14F-4D97-AF65-F5344CB8AC3E}">
@@ -7864,6 +7960,229 @@
     <p:extLst>
       <p:ext uri="{BB962C8B-B14F-4D97-AF65-F5344CB8AC3E}">
         <p14:creationId xmlns:p14="http://schemas.microsoft.com/office/powerpoint/2010/main" val="1252354762"/>
+      </p:ext>
+    </p:extLst>
+  </p:cSld>
+  <p:clrMapOvr>
+    <a:masterClrMapping/>
+  </p:clrMapOvr>
+</p:sld>
+</file>
+
+<file path=ppt/slides/slide20.xml><?xml version="1.0" encoding="utf-8"?>
+<p:sld xmlns:a="http://schemas.openxmlformats.org/drawingml/2006/main" xmlns:r="http://schemas.openxmlformats.org/officeDocument/2006/relationships" xmlns:p="http://schemas.openxmlformats.org/presentationml/2006/main">
+  <p:cSld>
+    <p:spTree>
+      <p:nvGrpSpPr>
+        <p:cNvPr id="1" name=""/>
+        <p:cNvGrpSpPr/>
+        <p:nvPr/>
+      </p:nvGrpSpPr>
+      <p:grpSpPr>
+        <a:xfrm>
+          <a:off x="0" y="0"/>
+          <a:ext cx="0" cy="0"/>
+          <a:chOff x="0" y="0"/>
+          <a:chExt cx="0" cy="0"/>
+        </a:xfrm>
+      </p:grpSpPr>
+      <p:sp>
+        <p:nvSpPr>
+          <p:cNvPr id="6" name="Textfeld 5">
+            <a:extLst>
+              <a:ext uri="{FF2B5EF4-FFF2-40B4-BE49-F238E27FC236}">
+                <a16:creationId xmlns:a16="http://schemas.microsoft.com/office/drawing/2014/main" id="{43BDBBCA-2D64-E13D-E511-E8953ECB5E22}"/>
+              </a:ext>
+            </a:extLst>
+          </p:cNvPr>
+          <p:cNvSpPr txBox="1"/>
+          <p:nvPr/>
+        </p:nvSpPr>
+        <p:spPr>
+          <a:xfrm>
+            <a:off x="181343" y="675644"/>
+            <a:ext cx="11829313" cy="923330"/>
+          </a:xfrm>
+          <a:prstGeom prst="rect">
+            <a:avLst/>
+          </a:prstGeom>
+          <a:noFill/>
+        </p:spPr>
+        <p:txBody>
+          <a:bodyPr wrap="square" rtlCol="0">
+            <a:spAutoFit/>
+          </a:bodyPr>
+          <a:lstStyle/>
+          <a:p>
+            <a:pPr marL="285750" indent="-285750">
+              <a:buFont typeface="Arial" panose="020B0604020202020204" pitchFamily="34" charset="0"/>
+              <a:buChar char="•"/>
+            </a:pPr>
+            <a:r>
+              <a:rPr lang="de-DE">
+                <a:sym typeface="Wingdings" pitchFamily="2" charset="2"/>
+              </a:rPr>
+              <a:t>On the first sight: For reconstruction of SST samples, </a:t>
+            </a:r>
+            <a:r>
+              <a:rPr lang="de-DE" b="1">
+                <a:sym typeface="Wingdings" pitchFamily="2" charset="2"/>
+              </a:rPr>
+              <a:t>we need more inputs</a:t>
+            </a:r>
+            <a:r>
+              <a:rPr lang="de-DE">
+                <a:sym typeface="Wingdings" pitchFamily="2" charset="2"/>
+              </a:rPr>
+              <a:t>!</a:t>
+            </a:r>
+          </a:p>
+          <a:p>
+            <a:pPr marL="285750" indent="-285750">
+              <a:buFont typeface="Arial" panose="020B0604020202020204" pitchFamily="34" charset="0"/>
+              <a:buChar char="•"/>
+            </a:pPr>
+            <a:r>
+              <a:rPr lang="de-DE">
+                <a:sym typeface="Wingdings" pitchFamily="2" charset="2"/>
+              </a:rPr>
+              <a:t>This is expected, due to </a:t>
+            </a:r>
+            <a:r>
+              <a:rPr lang="de-DE" b="1">
+                <a:sym typeface="Wingdings" pitchFamily="2" charset="2"/>
+              </a:rPr>
+              <a:t>smaller spatial scales </a:t>
+            </a:r>
+            <a:r>
+              <a:rPr lang="de-DE">
+                <a:sym typeface="Wingdings" pitchFamily="2" charset="2"/>
+              </a:rPr>
+              <a:t>for processes in the Ocean, compared to the atmosphere.</a:t>
+            </a:r>
+          </a:p>
+          <a:p>
+            <a:pPr marL="285750" indent="-285750">
+              <a:buFont typeface="Arial" panose="020B0604020202020204" pitchFamily="34" charset="0"/>
+              <a:buChar char="•"/>
+            </a:pPr>
+            <a:endParaRPr lang="de-DE">
+              <a:sym typeface="Wingdings" pitchFamily="2" charset="2"/>
+            </a:endParaRPr>
+          </a:p>
+        </p:txBody>
+      </p:sp>
+      <p:sp>
+        <p:nvSpPr>
+          <p:cNvPr id="3" name="Textfeld 2">
+            <a:extLst>
+              <a:ext uri="{FF2B5EF4-FFF2-40B4-BE49-F238E27FC236}">
+                <a16:creationId xmlns:a16="http://schemas.microsoft.com/office/drawing/2014/main" id="{C318182B-364D-C9F7-D1BC-5FD4D9781852}"/>
+              </a:ext>
+            </a:extLst>
+          </p:cNvPr>
+          <p:cNvSpPr txBox="1"/>
+          <p:nvPr/>
+        </p:nvSpPr>
+        <p:spPr>
+          <a:xfrm>
+            <a:off x="193812" y="148283"/>
+            <a:ext cx="8468274" cy="400110"/>
+          </a:xfrm>
+          <a:prstGeom prst="rect">
+            <a:avLst/>
+          </a:prstGeom>
+          <a:noFill/>
+        </p:spPr>
+        <p:txBody>
+          <a:bodyPr wrap="square" rtlCol="0">
+            <a:spAutoFit/>
+          </a:bodyPr>
+          <a:lstStyle/>
+          <a:p>
+            <a:r>
+              <a:rPr lang="de-DE" sz="2000" b="1"/>
+              <a:t>Next: </a:t>
+            </a:r>
+            <a:r>
+              <a:rPr lang="de-DE" sz="2000"/>
+              <a:t>Investigate </a:t>
+            </a:r>
+            <a:r>
+              <a:rPr lang="de-DE" sz="2000" b="1"/>
+              <a:t>sea surface temperature </a:t>
+            </a:r>
+            <a:r>
+              <a:rPr lang="de-DE" sz="2000"/>
+              <a:t>(SST) anomaly fields from CESM</a:t>
+            </a:r>
+          </a:p>
+        </p:txBody>
+      </p:sp>
+      <p:pic>
+        <p:nvPicPr>
+          <p:cNvPr id="2" name="Grafik 1">
+            <a:extLst>
+              <a:ext uri="{FF2B5EF4-FFF2-40B4-BE49-F238E27FC236}">
+                <a16:creationId xmlns:a16="http://schemas.microsoft.com/office/drawing/2014/main" id="{20E8D067-9B70-BA3E-9941-FDCD7CDCCF58}"/>
+              </a:ext>
+            </a:extLst>
+          </p:cNvPr>
+          <p:cNvPicPr>
+            <a:picLocks noChangeAspect="1"/>
+          </p:cNvPicPr>
+          <p:nvPr/>
+        </p:nvPicPr>
+        <p:blipFill>
+          <a:blip r:embed="rId2"/>
+          <a:stretch>
+            <a:fillRect/>
+          </a:stretch>
+        </p:blipFill>
+        <p:spPr>
+          <a:xfrm>
+            <a:off x="1137061" y="4303691"/>
+            <a:ext cx="7772400" cy="2554309"/>
+          </a:xfrm>
+          <a:prstGeom prst="rect">
+            <a:avLst/>
+          </a:prstGeom>
+        </p:spPr>
+      </p:pic>
+      <p:pic>
+        <p:nvPicPr>
+          <p:cNvPr id="7" name="Grafik 6">
+            <a:extLst>
+              <a:ext uri="{FF2B5EF4-FFF2-40B4-BE49-F238E27FC236}">
+                <a16:creationId xmlns:a16="http://schemas.microsoft.com/office/drawing/2014/main" id="{45F37F28-FEA6-7A26-41EC-FB82EDAAF43B}"/>
+              </a:ext>
+            </a:extLst>
+          </p:cNvPr>
+          <p:cNvPicPr>
+            <a:picLocks noChangeAspect="1"/>
+          </p:cNvPicPr>
+          <p:nvPr/>
+        </p:nvPicPr>
+        <p:blipFill>
+          <a:blip r:embed="rId3"/>
+          <a:stretch>
+            <a:fillRect/>
+          </a:stretch>
+        </p:blipFill>
+        <p:spPr>
+          <a:xfrm>
+            <a:off x="1137061" y="1657467"/>
+            <a:ext cx="7772400" cy="2587730"/>
+          </a:xfrm>
+          <a:prstGeom prst="rect">
+            <a:avLst/>
+          </a:prstGeom>
+        </p:spPr>
+      </p:pic>
+    </p:spTree>
+    <p:extLst>
+      <p:ext uri="{BB962C8B-B14F-4D97-AF65-F5344CB8AC3E}">
+        <p14:creationId xmlns:p14="http://schemas.microsoft.com/office/powerpoint/2010/main" val="4118534445"/>
       </p:ext>
     </p:extLst>
   </p:cSld>
@@ -11726,8 +12045,8 @@
           </a:prstGeom>
         </p:spPr>
       </p:pic>
-      <mc:AlternateContent xmlns:mc="http://schemas.openxmlformats.org/markup-compatibility/2006">
-        <mc:Choice xmlns:a14="http://schemas.microsoft.com/office/drawing/2010/main" Requires="a14">
+      <mc:AlternateContent xmlns:mc="http://schemas.openxmlformats.org/markup-compatibility/2006" xmlns:a14="http://schemas.microsoft.com/office/drawing/2010/main">
+        <mc:Choice Requires="a14">
           <p:sp>
             <p:nvSpPr>
               <p:cNvPr id="14" name="Textfeld 13">
@@ -11809,7 +12128,7 @@
             </p:txBody>
           </p:sp>
         </mc:Choice>
-        <mc:Fallback>
+        <mc:Fallback xmlns="">
           <p:sp>
             <p:nvSpPr>
               <p:cNvPr id="14" name="Textfeld 13">
@@ -12133,8 +12452,8 @@
           </a:p>
         </p:txBody>
       </p:sp>
-      <mc:AlternateContent xmlns:mc="http://schemas.openxmlformats.org/markup-compatibility/2006">
-        <mc:Choice xmlns:a14="http://schemas.microsoft.com/office/drawing/2010/main" Requires="a14">
+      <mc:AlternateContent xmlns:mc="http://schemas.openxmlformats.org/markup-compatibility/2006" xmlns:a14="http://schemas.microsoft.com/office/drawing/2010/main">
+        <mc:Choice Requires="a14">
           <p:sp>
             <p:nvSpPr>
               <p:cNvPr id="6" name="Textfeld 5">
@@ -12192,7 +12511,7 @@
             </p:txBody>
           </p:sp>
         </mc:Choice>
-        <mc:Fallback>
+        <mc:Fallback xmlns="">
           <p:sp>
             <p:nvSpPr>
               <p:cNvPr id="6" name="Textfeld 5">
@@ -12237,8 +12556,8 @@
           </p:sp>
         </mc:Fallback>
       </mc:AlternateContent>
-      <mc:AlternateContent xmlns:mc="http://schemas.openxmlformats.org/markup-compatibility/2006">
-        <mc:Choice xmlns:a14="http://schemas.microsoft.com/office/drawing/2010/main" Requires="a14">
+      <mc:AlternateContent xmlns:mc="http://schemas.openxmlformats.org/markup-compatibility/2006" xmlns:a14="http://schemas.microsoft.com/office/drawing/2010/main">
+        <mc:Choice Requires="a14">
           <p:graphicFrame>
             <p:nvGraphicFramePr>
               <p:cNvPr id="8" name="Tabelle 8">
@@ -13111,7 +13430,7 @@
             </a:graphic>
           </p:graphicFrame>
         </mc:Choice>
-        <mc:Fallback>
+        <mc:Fallback xmlns="">
           <p:graphicFrame>
             <p:nvGraphicFramePr>
               <p:cNvPr id="8" name="Tabelle 8">
@@ -13738,8 +14057,8 @@
           </a:p>
         </p:txBody>
       </p:sp>
-      <mc:AlternateContent xmlns:mc="http://schemas.openxmlformats.org/markup-compatibility/2006">
-        <mc:Choice xmlns:a14="http://schemas.microsoft.com/office/drawing/2010/main" Requires="a14">
+      <mc:AlternateContent xmlns:mc="http://schemas.openxmlformats.org/markup-compatibility/2006" xmlns:a14="http://schemas.microsoft.com/office/drawing/2010/main">
+        <mc:Choice Requires="a14">
           <p:sp>
             <p:nvSpPr>
               <p:cNvPr id="2" name="Textfeld 1">
@@ -13835,7 +14154,7 @@
             </p:txBody>
           </p:sp>
         </mc:Choice>
-        <mc:Fallback>
+        <mc:Fallback xmlns="">
           <p:sp>
             <p:nvSpPr>
               <p:cNvPr id="2" name="Textfeld 1">

</xml_diff>